<commit_message>
Updating the slides for lesson 19
</commit_message>
<xml_diff>
--- a/companion-website/public/files/19. Out of Context I Called My Prophecy.pptx
+++ b/companion-website/public/files/19. Out of Context I Called My Prophecy.pptx
@@ -5,7 +5,7 @@
     <p:sldMasterId id="2147483648" r:id="rId1"/>
   </p:sldMasterIdLst>
   <p:notesMasterIdLst>
-    <p:notesMasterId r:id="rId22"/>
+    <p:notesMasterId r:id="rId23"/>
   </p:notesMasterIdLst>
   <p:sldIdLst>
     <p:sldId id="275" r:id="rId2"/>
@@ -28,6 +28,7 @@
     <p:sldId id="459" r:id="rId19"/>
     <p:sldId id="450" r:id="rId20"/>
     <p:sldId id="451" r:id="rId21"/>
+    <p:sldId id="455" r:id="rId22"/>
   </p:sldIdLst>
   <p:sldSz cx="9144000" cy="6858000" type="screen4x3"/>
   <p:notesSz cx="6858000" cy="9144000"/>
@@ -492,6 +493,90 @@
     </a:lvl9pPr>
   </p:notesStyle>
 </p:notesMaster>
+</file>
+
+<file path=ppt/notesSlides/notesSlide1.xml><?xml version="1.0" encoding="utf-8"?>
+<p:notes xmlns:a="http://schemas.openxmlformats.org/drawingml/2006/main" xmlns:r="http://schemas.openxmlformats.org/officeDocument/2006/relationships" xmlns:p="http://schemas.openxmlformats.org/presentationml/2006/main">
+  <p:cSld>
+    <p:spTree>
+      <p:nvGrpSpPr>
+        <p:cNvPr id="1" name=""/>
+        <p:cNvGrpSpPr/>
+        <p:nvPr/>
+      </p:nvGrpSpPr>
+      <p:grpSpPr>
+        <a:xfrm>
+          <a:off x="0" y="0"/>
+          <a:ext cx="0" cy="0"/>
+          <a:chOff x="0" y="0"/>
+          <a:chExt cx="0" cy="0"/>
+        </a:xfrm>
+      </p:grpSpPr>
+      <p:sp>
+        <p:nvSpPr>
+          <p:cNvPr id="2" name="Slide Image Placeholder 1"/>
+          <p:cNvSpPr>
+            <a:spLocks noGrp="1" noRot="1" noChangeAspect="1"/>
+          </p:cNvSpPr>
+          <p:nvPr>
+            <p:ph type="sldImg"/>
+          </p:nvPr>
+        </p:nvSpPr>
+        <p:spPr/>
+      </p:sp>
+      <p:sp>
+        <p:nvSpPr>
+          <p:cNvPr id="3" name="Notes Placeholder 2"/>
+          <p:cNvSpPr>
+            <a:spLocks noGrp="1"/>
+          </p:cNvSpPr>
+          <p:nvPr>
+            <p:ph type="body" idx="1"/>
+          </p:nvPr>
+        </p:nvSpPr>
+        <p:spPr/>
+        <p:txBody>
+          <a:bodyPr/>
+          <a:lstStyle/>
+          <a:p>
+            <a:endParaRPr lang="en-US" dirty="0"/>
+          </a:p>
+        </p:txBody>
+      </p:sp>
+      <p:sp>
+        <p:nvSpPr>
+          <p:cNvPr id="4" name="Slide Number Placeholder 3"/>
+          <p:cNvSpPr>
+            <a:spLocks noGrp="1"/>
+          </p:cNvSpPr>
+          <p:nvPr>
+            <p:ph type="sldNum" sz="quarter" idx="10"/>
+          </p:nvPr>
+        </p:nvSpPr>
+        <p:spPr/>
+        <p:txBody>
+          <a:bodyPr/>
+          <a:lstStyle/>
+          <a:p>
+            <a:fld id="{0A2C3B37-55FA-284F-9E83-751B4EA6E9B4}" type="slidenum">
+              <a:rPr lang="en-US" smtClean="0"/>
+              <a:t>21</a:t>
+            </a:fld>
+            <a:endParaRPr lang="en-US"/>
+          </a:p>
+        </p:txBody>
+      </p:sp>
+    </p:spTree>
+    <p:extLst>
+      <p:ext uri="{BB962C8B-B14F-4D97-AF65-F5344CB8AC3E}">
+        <p14:creationId xmlns:p14="http://schemas.microsoft.com/office/powerpoint/2010/main" val="79895830"/>
+      </p:ext>
+    </p:extLst>
+  </p:cSld>
+  <p:clrMapOvr>
+    <a:masterClrMapping/>
+  </p:clrMapOvr>
+</p:notes>
 </file>
 
 <file path=ppt/slideLayouts/slideLayout1.xml><?xml version="1.0" encoding="utf-8"?>
@@ -7716,7 +7801,15 @@
             <a:p>
               <a:r>
                 <a:rPr lang="en-US" sz="2800" dirty="0"/>
-                <a:t>So that we are not swayed by arguments that assume the prophecies are taken out of context</a:t>
+                <a:t>So that we are not swayed by arguments that assume the prophecies are </a:t>
+              </a:r>
+              <a:r>
+                <a:rPr lang="en-US" sz="2800" b="1" dirty="0">
+                  <a:highlight>
+                    <a:srgbClr val="C00002"/>
+                  </a:highlight>
+                </a:rPr>
+                <a:t>taken out of context</a:t>
               </a:r>
             </a:p>
           </p:txBody>
@@ -7811,7 +7904,23 @@
             <a:p>
               <a:r>
                 <a:rPr lang="en-US" sz="2800" dirty="0"/>
-                <a:t>By showing that the fulfillments are not all simple 1-to-1 prophecies but often require significant contextual knowledge to understand the links</a:t>
+                <a:t>By showing that the fulfillments are not all simple 1-to-1 prophecies are sometimes require knowing </a:t>
+              </a:r>
+              <a:r>
+                <a:rPr lang="en-US" sz="2800" b="1" i="1" dirty="0">
+                  <a:highlight>
+                    <a:srgbClr val="C00002"/>
+                  </a:highlight>
+                </a:rPr>
+                <a:t>more</a:t>
+              </a:r>
+              <a:r>
+                <a:rPr lang="en-US" sz="2800" b="1" dirty="0">
+                  <a:highlight>
+                    <a:srgbClr val="C00002"/>
+                  </a:highlight>
+                </a:rPr>
+                <a:t> context</a:t>
               </a:r>
             </a:p>
           </p:txBody>
@@ -7834,7 +7943,7 @@
         <p:spPr>
           <a:xfrm>
             <a:off x="1373874" y="1669464"/>
-            <a:ext cx="0" cy="4197936"/>
+            <a:ext cx="0" cy="4363731"/>
           </a:xfrm>
           <a:prstGeom prst="line">
             <a:avLst/>
@@ -8273,6 +8382,835 @@
   <p:clrMapOvr>
     <a:masterClrMapping/>
   </p:clrMapOvr>
+</p:sld>
+</file>
+
+<file path=ppt/slides/slide21.xml><?xml version="1.0" encoding="utf-8"?>
+<p:sld xmlns:a="http://schemas.openxmlformats.org/drawingml/2006/main" xmlns:r="http://schemas.openxmlformats.org/officeDocument/2006/relationships" xmlns:p="http://schemas.openxmlformats.org/presentationml/2006/main">
+  <p:cSld>
+    <p:spTree>
+      <p:nvGrpSpPr>
+        <p:cNvPr id="1" name=""/>
+        <p:cNvGrpSpPr/>
+        <p:nvPr/>
+      </p:nvGrpSpPr>
+      <p:grpSpPr>
+        <a:xfrm>
+          <a:off x="0" y="0"/>
+          <a:ext cx="0" cy="0"/>
+          <a:chOff x="0" y="0"/>
+          <a:chExt cx="0" cy="0"/>
+        </a:xfrm>
+      </p:grpSpPr>
+      <p:sp>
+        <p:nvSpPr>
+          <p:cNvPr id="6" name="TextBox 5"/>
+          <p:cNvSpPr txBox="1"/>
+          <p:nvPr/>
+        </p:nvSpPr>
+        <p:spPr>
+          <a:xfrm>
+            <a:off x="228600" y="152400"/>
+            <a:ext cx="8610600" cy="769441"/>
+          </a:xfrm>
+          <a:prstGeom prst="rect">
+            <a:avLst/>
+          </a:prstGeom>
+          <a:noFill/>
+        </p:spPr>
+        <p:txBody>
+          <a:bodyPr wrap="square" rtlCol="0">
+            <a:spAutoFit/>
+          </a:bodyPr>
+          <a:lstStyle/>
+          <a:p>
+            <a:r>
+              <a:rPr lang="en-US" sz="4400" b="1" dirty="0"/>
+              <a:t>Key Takeaways</a:t>
+            </a:r>
+          </a:p>
+        </p:txBody>
+      </p:sp>
+      <p:grpSp>
+        <p:nvGrpSpPr>
+          <p:cNvPr id="12" name="Group 11">
+            <a:extLst>
+              <a:ext uri="{FF2B5EF4-FFF2-40B4-BE49-F238E27FC236}">
+                <a16:creationId xmlns:a16="http://schemas.microsoft.com/office/drawing/2014/main" id="{9C7293A5-9F6A-4A42-B28F-77E682AEFD25}"/>
+              </a:ext>
+            </a:extLst>
+          </p:cNvPr>
+          <p:cNvGrpSpPr/>
+          <p:nvPr/>
+        </p:nvGrpSpPr>
+        <p:grpSpPr>
+          <a:xfrm>
+            <a:off x="533400" y="2895600"/>
+            <a:ext cx="8001000" cy="685800"/>
+            <a:chOff x="533400" y="2895600"/>
+            <a:chExt cx="8001000" cy="685800"/>
+          </a:xfrm>
+        </p:grpSpPr>
+        <p:sp>
+          <p:nvSpPr>
+            <p:cNvPr id="7" name="Oval 6">
+              <a:extLst>
+                <a:ext uri="{FF2B5EF4-FFF2-40B4-BE49-F238E27FC236}">
+                  <a16:creationId xmlns:a16="http://schemas.microsoft.com/office/drawing/2014/main" id="{536B79E8-7DCE-0445-821B-D0B03DF78CAA}"/>
+                </a:ext>
+              </a:extLst>
+            </p:cNvPr>
+            <p:cNvSpPr/>
+            <p:nvPr/>
+          </p:nvSpPr>
+          <p:spPr>
+            <a:xfrm>
+              <a:off x="533400" y="2895600"/>
+              <a:ext cx="685800" cy="685800"/>
+            </a:xfrm>
+            <a:prstGeom prst="ellipse">
+              <a:avLst/>
+            </a:prstGeom>
+            <a:solidFill>
+              <a:srgbClr val="009EC0"/>
+            </a:solidFill>
+            <a:ln>
+              <a:noFill/>
+            </a:ln>
+          </p:spPr>
+          <p:style>
+            <a:lnRef idx="2">
+              <a:schemeClr val="accent1">
+                <a:shade val="50000"/>
+              </a:schemeClr>
+            </a:lnRef>
+            <a:fillRef idx="1">
+              <a:schemeClr val="accent1"/>
+            </a:fillRef>
+            <a:effectRef idx="0">
+              <a:schemeClr val="accent1"/>
+            </a:effectRef>
+            <a:fontRef idx="minor">
+              <a:schemeClr val="lt1"/>
+            </a:fontRef>
+          </p:style>
+          <p:txBody>
+            <a:bodyPr rtlCol="0" anchor="ctr"/>
+            <a:lstStyle/>
+            <a:p>
+              <a:pPr algn="ctr"/>
+              <a:r>
+                <a:rPr lang="en-US" sz="2800" dirty="0">
+                  <a:solidFill>
+                    <a:schemeClr val="tx1"/>
+                  </a:solidFill>
+                </a:rPr>
+                <a:t>2</a:t>
+              </a:r>
+            </a:p>
+          </p:txBody>
+        </p:sp>
+        <p:sp>
+          <p:nvSpPr>
+            <p:cNvPr id="4" name="Rectangle 3">
+              <a:extLst>
+                <a:ext uri="{FF2B5EF4-FFF2-40B4-BE49-F238E27FC236}">
+                  <a16:creationId xmlns:a16="http://schemas.microsoft.com/office/drawing/2014/main" id="{8330B7FE-A318-9845-8F59-02267667CECB}"/>
+                </a:ext>
+              </a:extLst>
+            </p:cNvPr>
+            <p:cNvSpPr/>
+            <p:nvPr/>
+          </p:nvSpPr>
+          <p:spPr>
+            <a:xfrm>
+              <a:off x="1447800" y="2895600"/>
+              <a:ext cx="7086600" cy="685800"/>
+            </a:xfrm>
+            <a:prstGeom prst="rect">
+              <a:avLst/>
+            </a:prstGeom>
+            <a:noFill/>
+            <a:ln>
+              <a:noFill/>
+            </a:ln>
+          </p:spPr>
+          <p:style>
+            <a:lnRef idx="2">
+              <a:schemeClr val="accent1">
+                <a:shade val="50000"/>
+              </a:schemeClr>
+            </a:lnRef>
+            <a:fillRef idx="1">
+              <a:schemeClr val="accent1"/>
+            </a:fillRef>
+            <a:effectRef idx="0">
+              <a:schemeClr val="accent1"/>
+            </a:effectRef>
+            <a:fontRef idx="minor">
+              <a:schemeClr val="lt1"/>
+            </a:fontRef>
+          </p:style>
+          <p:txBody>
+            <a:bodyPr rtlCol="0" anchor="ctr"/>
+            <a:lstStyle/>
+            <a:p>
+              <a:r>
+                <a:rPr lang="en-US" sz="2400" dirty="0">
+                  <a:solidFill>
+                    <a:schemeClr val="tx1"/>
+                  </a:solidFill>
+                </a:rPr>
+                <a:t>Don’t give up quickly, some of the fulfillments </a:t>
+              </a:r>
+              <a:r>
+                <a:rPr lang="en-US" sz="2400" b="1" dirty="0">
+                  <a:solidFill>
+                    <a:schemeClr val="tx1"/>
+                  </a:solidFill>
+                  <a:highlight>
+                    <a:srgbClr val="C00002"/>
+                  </a:highlight>
+                </a:rPr>
+                <a:t>require lots of context</a:t>
+              </a:r>
+              <a:r>
+                <a:rPr lang="en-US" sz="2400" dirty="0">
+                  <a:solidFill>
+                    <a:schemeClr val="tx1"/>
+                  </a:solidFill>
+                </a:rPr>
+                <a:t>; expect open questions</a:t>
+              </a:r>
+            </a:p>
+          </p:txBody>
+        </p:sp>
+      </p:grpSp>
+      <p:grpSp>
+        <p:nvGrpSpPr>
+          <p:cNvPr id="9" name="Group 8">
+            <a:extLst>
+              <a:ext uri="{FF2B5EF4-FFF2-40B4-BE49-F238E27FC236}">
+                <a16:creationId xmlns:a16="http://schemas.microsoft.com/office/drawing/2014/main" id="{55676BE1-B42E-AD44-9DD5-FF20BEB47F36}"/>
+              </a:ext>
+            </a:extLst>
+          </p:cNvPr>
+          <p:cNvGrpSpPr/>
+          <p:nvPr/>
+        </p:nvGrpSpPr>
+        <p:grpSpPr>
+          <a:xfrm>
+            <a:off x="533400" y="1833265"/>
+            <a:ext cx="8001000" cy="685800"/>
+            <a:chOff x="533400" y="1833265"/>
+            <a:chExt cx="8001000" cy="685800"/>
+          </a:xfrm>
+        </p:grpSpPr>
+        <p:sp>
+          <p:nvSpPr>
+            <p:cNvPr id="2" name="Oval 1">
+              <a:extLst>
+                <a:ext uri="{FF2B5EF4-FFF2-40B4-BE49-F238E27FC236}">
+                  <a16:creationId xmlns:a16="http://schemas.microsoft.com/office/drawing/2014/main" id="{876D5A54-0C8D-804B-88A0-6609A2C1405C}"/>
+                </a:ext>
+              </a:extLst>
+            </p:cNvPr>
+            <p:cNvSpPr/>
+            <p:nvPr/>
+          </p:nvSpPr>
+          <p:spPr>
+            <a:xfrm>
+              <a:off x="533400" y="1833265"/>
+              <a:ext cx="685800" cy="685800"/>
+            </a:xfrm>
+            <a:prstGeom prst="ellipse">
+              <a:avLst/>
+            </a:prstGeom>
+            <a:solidFill>
+              <a:srgbClr val="009EC0"/>
+            </a:solidFill>
+            <a:ln>
+              <a:noFill/>
+            </a:ln>
+          </p:spPr>
+          <p:style>
+            <a:lnRef idx="2">
+              <a:schemeClr val="accent1">
+                <a:shade val="50000"/>
+              </a:schemeClr>
+            </a:lnRef>
+            <a:fillRef idx="1">
+              <a:schemeClr val="accent1"/>
+            </a:fillRef>
+            <a:effectRef idx="0">
+              <a:schemeClr val="accent1"/>
+            </a:effectRef>
+            <a:fontRef idx="minor">
+              <a:schemeClr val="lt1"/>
+            </a:fontRef>
+          </p:style>
+          <p:txBody>
+            <a:bodyPr rtlCol="0" anchor="ctr"/>
+            <a:lstStyle/>
+            <a:p>
+              <a:pPr algn="ctr"/>
+              <a:r>
+                <a:rPr lang="en-US" sz="2800" dirty="0">
+                  <a:solidFill>
+                    <a:schemeClr val="tx1"/>
+                  </a:solidFill>
+                </a:rPr>
+                <a:t>1</a:t>
+              </a:r>
+            </a:p>
+          </p:txBody>
+        </p:sp>
+        <p:sp>
+          <p:nvSpPr>
+            <p:cNvPr id="10" name="Rectangle 9">
+              <a:extLst>
+                <a:ext uri="{FF2B5EF4-FFF2-40B4-BE49-F238E27FC236}">
+                  <a16:creationId xmlns:a16="http://schemas.microsoft.com/office/drawing/2014/main" id="{312C2DC5-5653-DC4B-98A2-76A0B8F08883}"/>
+                </a:ext>
+              </a:extLst>
+            </p:cNvPr>
+            <p:cNvSpPr/>
+            <p:nvPr/>
+          </p:nvSpPr>
+          <p:spPr>
+            <a:xfrm>
+              <a:off x="1447800" y="1833265"/>
+              <a:ext cx="7086600" cy="685800"/>
+            </a:xfrm>
+            <a:prstGeom prst="rect">
+              <a:avLst/>
+            </a:prstGeom>
+            <a:noFill/>
+            <a:ln>
+              <a:noFill/>
+            </a:ln>
+          </p:spPr>
+          <p:style>
+            <a:lnRef idx="2">
+              <a:schemeClr val="accent1">
+                <a:shade val="50000"/>
+              </a:schemeClr>
+            </a:lnRef>
+            <a:fillRef idx="1">
+              <a:schemeClr val="accent1"/>
+            </a:fillRef>
+            <a:effectRef idx="0">
+              <a:schemeClr val="accent1"/>
+            </a:effectRef>
+            <a:fontRef idx="minor">
+              <a:schemeClr val="lt1"/>
+            </a:fontRef>
+          </p:style>
+          <p:txBody>
+            <a:bodyPr rtlCol="0" anchor="ctr"/>
+            <a:lstStyle/>
+            <a:p>
+              <a:r>
+                <a:rPr lang="en-US" sz="2400" dirty="0">
+                  <a:solidFill>
+                    <a:schemeClr val="tx1"/>
+                  </a:solidFill>
+                </a:rPr>
+                <a:t>Prophecy fulfillments come in a </a:t>
+              </a:r>
+              <a:r>
+                <a:rPr lang="en-US" sz="2400" b="1" dirty="0">
+                  <a:solidFill>
+                    <a:schemeClr val="tx1"/>
+                  </a:solidFill>
+                  <a:highlight>
+                    <a:srgbClr val="C00002"/>
+                  </a:highlight>
+                </a:rPr>
+                <a:t>variety of forms</a:t>
+              </a:r>
+            </a:p>
+          </p:txBody>
+        </p:sp>
+      </p:grpSp>
+      <p:grpSp>
+        <p:nvGrpSpPr>
+          <p:cNvPr id="14" name="Group 13">
+            <a:extLst>
+              <a:ext uri="{FF2B5EF4-FFF2-40B4-BE49-F238E27FC236}">
+                <a16:creationId xmlns:a16="http://schemas.microsoft.com/office/drawing/2014/main" id="{F0A87E3B-646D-1E41-9334-E8ECC604DF38}"/>
+              </a:ext>
+            </a:extLst>
+          </p:cNvPr>
+          <p:cNvGrpSpPr/>
+          <p:nvPr/>
+        </p:nvGrpSpPr>
+        <p:grpSpPr>
+          <a:xfrm>
+            <a:off x="533400" y="3957935"/>
+            <a:ext cx="8001000" cy="685800"/>
+            <a:chOff x="533400" y="2895600"/>
+            <a:chExt cx="8001000" cy="685800"/>
+          </a:xfrm>
+        </p:grpSpPr>
+        <p:sp>
+          <p:nvSpPr>
+            <p:cNvPr id="15" name="Oval 14">
+              <a:extLst>
+                <a:ext uri="{FF2B5EF4-FFF2-40B4-BE49-F238E27FC236}">
+                  <a16:creationId xmlns:a16="http://schemas.microsoft.com/office/drawing/2014/main" id="{602F0422-D845-1E4E-A7C5-B2069A212A2E}"/>
+                </a:ext>
+              </a:extLst>
+            </p:cNvPr>
+            <p:cNvSpPr/>
+            <p:nvPr/>
+          </p:nvSpPr>
+          <p:spPr>
+            <a:xfrm>
+              <a:off x="533400" y="2895600"/>
+              <a:ext cx="685800" cy="685800"/>
+            </a:xfrm>
+            <a:prstGeom prst="ellipse">
+              <a:avLst/>
+            </a:prstGeom>
+            <a:solidFill>
+              <a:srgbClr val="009EC0"/>
+            </a:solidFill>
+            <a:ln>
+              <a:noFill/>
+            </a:ln>
+          </p:spPr>
+          <p:style>
+            <a:lnRef idx="2">
+              <a:schemeClr val="accent1">
+                <a:shade val="50000"/>
+              </a:schemeClr>
+            </a:lnRef>
+            <a:fillRef idx="1">
+              <a:schemeClr val="accent1"/>
+            </a:fillRef>
+            <a:effectRef idx="0">
+              <a:schemeClr val="accent1"/>
+            </a:effectRef>
+            <a:fontRef idx="minor">
+              <a:schemeClr val="lt1"/>
+            </a:fontRef>
+          </p:style>
+          <p:txBody>
+            <a:bodyPr rtlCol="0" anchor="ctr"/>
+            <a:lstStyle/>
+            <a:p>
+              <a:pPr algn="ctr"/>
+              <a:r>
+                <a:rPr lang="en-US" sz="2800" dirty="0">
+                  <a:solidFill>
+                    <a:schemeClr val="tx1"/>
+                  </a:solidFill>
+                </a:rPr>
+                <a:t>3</a:t>
+              </a:r>
+            </a:p>
+          </p:txBody>
+        </p:sp>
+        <p:sp>
+          <p:nvSpPr>
+            <p:cNvPr id="16" name="Rectangle 15">
+              <a:extLst>
+                <a:ext uri="{FF2B5EF4-FFF2-40B4-BE49-F238E27FC236}">
+                  <a16:creationId xmlns:a16="http://schemas.microsoft.com/office/drawing/2014/main" id="{93230A02-C278-BF4F-B7D5-75C53BF2251C}"/>
+                </a:ext>
+              </a:extLst>
+            </p:cNvPr>
+            <p:cNvSpPr/>
+            <p:nvPr/>
+          </p:nvSpPr>
+          <p:spPr>
+            <a:xfrm>
+              <a:off x="1447800" y="2895600"/>
+              <a:ext cx="7086600" cy="685800"/>
+            </a:xfrm>
+            <a:prstGeom prst="rect">
+              <a:avLst/>
+            </a:prstGeom>
+            <a:noFill/>
+            <a:ln>
+              <a:noFill/>
+            </a:ln>
+          </p:spPr>
+          <p:style>
+            <a:lnRef idx="2">
+              <a:schemeClr val="accent1">
+                <a:shade val="50000"/>
+              </a:schemeClr>
+            </a:lnRef>
+            <a:fillRef idx="1">
+              <a:schemeClr val="accent1"/>
+            </a:fillRef>
+            <a:effectRef idx="0">
+              <a:schemeClr val="accent1"/>
+            </a:effectRef>
+            <a:fontRef idx="minor">
+              <a:schemeClr val="lt1"/>
+            </a:fontRef>
+          </p:style>
+          <p:txBody>
+            <a:bodyPr rtlCol="0" anchor="ctr"/>
+            <a:lstStyle/>
+            <a:p>
+              <a:r>
+                <a:rPr lang="en-US" sz="2400" dirty="0">
+                  <a:solidFill>
+                    <a:schemeClr val="tx1"/>
+                  </a:solidFill>
+                </a:rPr>
+                <a:t>Some fulfillments make a better case for defending the Gospel than others</a:t>
+              </a:r>
+            </a:p>
+          </p:txBody>
+        </p:sp>
+      </p:grpSp>
+      <p:cxnSp>
+        <p:nvCxnSpPr>
+          <p:cNvPr id="8" name="Straight Connector 7">
+            <a:extLst>
+              <a:ext uri="{FF2B5EF4-FFF2-40B4-BE49-F238E27FC236}">
+                <a16:creationId xmlns:a16="http://schemas.microsoft.com/office/drawing/2014/main" id="{B1CE1C68-C736-2F42-AD3D-29FCB9A69CAD}"/>
+              </a:ext>
+            </a:extLst>
+          </p:cNvPr>
+          <p:cNvCxnSpPr>
+            <a:cxnSpLocks/>
+          </p:cNvCxnSpPr>
+          <p:nvPr/>
+        </p:nvCxnSpPr>
+        <p:spPr>
+          <a:xfrm>
+            <a:off x="304800" y="1066800"/>
+            <a:ext cx="8534400" cy="0"/>
+          </a:xfrm>
+          <a:prstGeom prst="line">
+            <a:avLst/>
+          </a:prstGeom>
+          <a:ln w="76200">
+            <a:solidFill>
+              <a:srgbClr val="009EC0"/>
+            </a:solidFill>
+          </a:ln>
+        </p:spPr>
+        <p:style>
+          <a:lnRef idx="1">
+            <a:schemeClr val="dk1"/>
+          </a:lnRef>
+          <a:fillRef idx="0">
+            <a:schemeClr val="dk1"/>
+          </a:fillRef>
+          <a:effectRef idx="0">
+            <a:schemeClr val="dk1"/>
+          </a:effectRef>
+          <a:fontRef idx="minor">
+            <a:schemeClr val="tx1"/>
+          </a:fontRef>
+        </p:style>
+      </p:cxnSp>
+    </p:spTree>
+    <p:extLst>
+      <p:ext uri="{BB962C8B-B14F-4D97-AF65-F5344CB8AC3E}">
+        <p14:creationId xmlns:p14="http://schemas.microsoft.com/office/powerpoint/2010/main" val="1560350112"/>
+      </p:ext>
+    </p:extLst>
+  </p:cSld>
+  <p:clrMapOvr>
+    <a:masterClrMapping/>
+  </p:clrMapOvr>
+  <p:timing>
+    <p:tnLst>
+      <p:par>
+        <p:cTn id="1" dur="indefinite" restart="never" nodeType="tmRoot">
+          <p:childTnLst>
+            <p:seq concurrent="1" nextAc="seek">
+              <p:cTn id="2" dur="indefinite" nodeType="mainSeq">
+                <p:childTnLst>
+                  <p:par>
+                    <p:cTn id="3" fill="hold">
+                      <p:stCondLst>
+                        <p:cond delay="indefinite"/>
+                      </p:stCondLst>
+                      <p:childTnLst>
+                        <p:par>
+                          <p:cTn id="4" fill="hold">
+                            <p:stCondLst>
+                              <p:cond delay="0"/>
+                            </p:stCondLst>
+                            <p:childTnLst>
+                              <p:par>
+                                <p:cTn id="5" presetID="10" presetClass="entr" presetSubtype="0" fill="hold" grpId="0" nodeType="clickEffect">
+                                  <p:stCondLst>
+                                    <p:cond delay="0"/>
+                                  </p:stCondLst>
+                                  <p:childTnLst>
+                                    <p:set>
+                                      <p:cBhvr>
+                                        <p:cTn id="6" dur="1" fill="hold">
+                                          <p:stCondLst>
+                                            <p:cond delay="0"/>
+                                          </p:stCondLst>
+                                        </p:cTn>
+                                        <p:tgtEl>
+                                          <p:spTgt spid="6"/>
+                                        </p:tgtEl>
+                                        <p:attrNameLst>
+                                          <p:attrName>style.visibility</p:attrName>
+                                        </p:attrNameLst>
+                                      </p:cBhvr>
+                                      <p:to>
+                                        <p:strVal val="visible"/>
+                                      </p:to>
+                                    </p:set>
+                                    <p:animEffect transition="in" filter="fade">
+                                      <p:cBhvr>
+                                        <p:cTn id="7" dur="250"/>
+                                        <p:tgtEl>
+                                          <p:spTgt spid="6"/>
+                                        </p:tgtEl>
+                                      </p:cBhvr>
+                                    </p:animEffect>
+                                  </p:childTnLst>
+                                </p:cTn>
+                              </p:par>
+                            </p:childTnLst>
+                          </p:cTn>
+                        </p:par>
+                        <p:par>
+                          <p:cTn id="8" fill="hold">
+                            <p:stCondLst>
+                              <p:cond delay="250"/>
+                            </p:stCondLst>
+                            <p:childTnLst>
+                              <p:par>
+                                <p:cTn id="9" presetID="10" presetClass="entr" presetSubtype="0" fill="hold" nodeType="afterEffect">
+                                  <p:stCondLst>
+                                    <p:cond delay="0"/>
+                                  </p:stCondLst>
+                                  <p:childTnLst>
+                                    <p:set>
+                                      <p:cBhvr>
+                                        <p:cTn id="10" dur="1" fill="hold">
+                                          <p:stCondLst>
+                                            <p:cond delay="0"/>
+                                          </p:stCondLst>
+                                        </p:cTn>
+                                        <p:tgtEl>
+                                          <p:spTgt spid="8"/>
+                                        </p:tgtEl>
+                                        <p:attrNameLst>
+                                          <p:attrName>style.visibility</p:attrName>
+                                        </p:attrNameLst>
+                                      </p:cBhvr>
+                                      <p:to>
+                                        <p:strVal val="visible"/>
+                                      </p:to>
+                                    </p:set>
+                                    <p:animEffect transition="in" filter="fade">
+                                      <p:cBhvr>
+                                        <p:cTn id="11" dur="250"/>
+                                        <p:tgtEl>
+                                          <p:spTgt spid="8"/>
+                                        </p:tgtEl>
+                                      </p:cBhvr>
+                                    </p:animEffect>
+                                  </p:childTnLst>
+                                </p:cTn>
+                              </p:par>
+                            </p:childTnLst>
+                          </p:cTn>
+                        </p:par>
+                      </p:childTnLst>
+                    </p:cTn>
+                  </p:par>
+                  <p:par>
+                    <p:cTn id="12" fill="hold">
+                      <p:stCondLst>
+                        <p:cond delay="indefinite"/>
+                      </p:stCondLst>
+                      <p:childTnLst>
+                        <p:par>
+                          <p:cTn id="13" fill="hold">
+                            <p:stCondLst>
+                              <p:cond delay="0"/>
+                            </p:stCondLst>
+                            <p:childTnLst>
+                              <p:par>
+                                <p:cTn id="14" presetID="10" presetClass="entr" presetSubtype="0" fill="hold" nodeType="clickEffect">
+                                  <p:stCondLst>
+                                    <p:cond delay="0"/>
+                                  </p:stCondLst>
+                                  <p:childTnLst>
+                                    <p:set>
+                                      <p:cBhvr>
+                                        <p:cTn id="15" dur="1" fill="hold">
+                                          <p:stCondLst>
+                                            <p:cond delay="0"/>
+                                          </p:stCondLst>
+                                        </p:cTn>
+                                        <p:tgtEl>
+                                          <p:spTgt spid="9"/>
+                                        </p:tgtEl>
+                                        <p:attrNameLst>
+                                          <p:attrName>style.visibility</p:attrName>
+                                        </p:attrNameLst>
+                                      </p:cBhvr>
+                                      <p:to>
+                                        <p:strVal val="visible"/>
+                                      </p:to>
+                                    </p:set>
+                                    <p:animEffect transition="in" filter="fade">
+                                      <p:cBhvr>
+                                        <p:cTn id="16" dur="250"/>
+                                        <p:tgtEl>
+                                          <p:spTgt spid="9"/>
+                                        </p:tgtEl>
+                                      </p:cBhvr>
+                                    </p:animEffect>
+                                  </p:childTnLst>
+                                </p:cTn>
+                              </p:par>
+                            </p:childTnLst>
+                          </p:cTn>
+                        </p:par>
+                      </p:childTnLst>
+                    </p:cTn>
+                  </p:par>
+                  <p:par>
+                    <p:cTn id="17" fill="hold">
+                      <p:stCondLst>
+                        <p:cond delay="indefinite"/>
+                      </p:stCondLst>
+                      <p:childTnLst>
+                        <p:par>
+                          <p:cTn id="18" fill="hold">
+                            <p:stCondLst>
+                              <p:cond delay="0"/>
+                            </p:stCondLst>
+                            <p:childTnLst>
+                              <p:par>
+                                <p:cTn id="19" presetID="10" presetClass="entr" presetSubtype="0" fill="hold" nodeType="clickEffect">
+                                  <p:stCondLst>
+                                    <p:cond delay="0"/>
+                                  </p:stCondLst>
+                                  <p:childTnLst>
+                                    <p:set>
+                                      <p:cBhvr>
+                                        <p:cTn id="20" dur="1" fill="hold">
+                                          <p:stCondLst>
+                                            <p:cond delay="0"/>
+                                          </p:stCondLst>
+                                        </p:cTn>
+                                        <p:tgtEl>
+                                          <p:spTgt spid="12"/>
+                                        </p:tgtEl>
+                                        <p:attrNameLst>
+                                          <p:attrName>style.visibility</p:attrName>
+                                        </p:attrNameLst>
+                                      </p:cBhvr>
+                                      <p:to>
+                                        <p:strVal val="visible"/>
+                                      </p:to>
+                                    </p:set>
+                                    <p:animEffect transition="in" filter="fade">
+                                      <p:cBhvr>
+                                        <p:cTn id="21" dur="250"/>
+                                        <p:tgtEl>
+                                          <p:spTgt spid="12"/>
+                                        </p:tgtEl>
+                                      </p:cBhvr>
+                                    </p:animEffect>
+                                  </p:childTnLst>
+                                </p:cTn>
+                              </p:par>
+                            </p:childTnLst>
+                          </p:cTn>
+                        </p:par>
+                      </p:childTnLst>
+                    </p:cTn>
+                  </p:par>
+                  <p:par>
+                    <p:cTn id="22" fill="hold">
+                      <p:stCondLst>
+                        <p:cond delay="indefinite"/>
+                      </p:stCondLst>
+                      <p:childTnLst>
+                        <p:par>
+                          <p:cTn id="23" fill="hold">
+                            <p:stCondLst>
+                              <p:cond delay="0"/>
+                            </p:stCondLst>
+                            <p:childTnLst>
+                              <p:par>
+                                <p:cTn id="24" presetID="10" presetClass="entr" presetSubtype="0" fill="hold" nodeType="clickEffect">
+                                  <p:stCondLst>
+                                    <p:cond delay="0"/>
+                                  </p:stCondLst>
+                                  <p:childTnLst>
+                                    <p:set>
+                                      <p:cBhvr>
+                                        <p:cTn id="25" dur="1" fill="hold">
+                                          <p:stCondLst>
+                                            <p:cond delay="0"/>
+                                          </p:stCondLst>
+                                        </p:cTn>
+                                        <p:tgtEl>
+                                          <p:spTgt spid="14"/>
+                                        </p:tgtEl>
+                                        <p:attrNameLst>
+                                          <p:attrName>style.visibility</p:attrName>
+                                        </p:attrNameLst>
+                                      </p:cBhvr>
+                                      <p:to>
+                                        <p:strVal val="visible"/>
+                                      </p:to>
+                                    </p:set>
+                                    <p:animEffect transition="in" filter="fade">
+                                      <p:cBhvr>
+                                        <p:cTn id="26" dur="250"/>
+                                        <p:tgtEl>
+                                          <p:spTgt spid="14"/>
+                                        </p:tgtEl>
+                                      </p:cBhvr>
+                                    </p:animEffect>
+                                  </p:childTnLst>
+                                </p:cTn>
+                              </p:par>
+                            </p:childTnLst>
+                          </p:cTn>
+                        </p:par>
+                      </p:childTnLst>
+                    </p:cTn>
+                  </p:par>
+                </p:childTnLst>
+              </p:cTn>
+              <p:prevCondLst>
+                <p:cond evt="onPrev" delay="0">
+                  <p:tgtEl>
+                    <p:sldTgt/>
+                  </p:tgtEl>
+                </p:cond>
+              </p:prevCondLst>
+              <p:nextCondLst>
+                <p:cond evt="onNext" delay="0">
+                  <p:tgtEl>
+                    <p:sldTgt/>
+                  </p:tgtEl>
+                </p:cond>
+              </p:nextCondLst>
+            </p:seq>
+          </p:childTnLst>
+        </p:cTn>
+      </p:par>
+    </p:tnLst>
+    <p:bldLst>
+      <p:bldP spid="6" grpId="0"/>
+    </p:bldLst>
+  </p:timing>
 </p:sld>
 </file>
 

</xml_diff>